<commit_message>
- Ajout de la prise en charge de l'encodage Windows-1252 dans le programme. - Mise à jour du fichier .gitignore pour inclure les fichiers CSV et PPTX. - Ajout de la référence au package System.Text.Encoding.CodePages.
</commit_message>
<xml_diff>
--- a/template.pptx
+++ b/template.pptx
@@ -259,7 +259,7 @@
           <a:p>
             <a:fld id="{6D268A9F-5B74-4C7A-8210-6C461655F85B}" type="datetimeFigureOut">
               <a:rPr lang="fr-FR" smtClean="0"/>
-              <a:t>16/06/2025</a:t>
+              <a:t>17/06/2025</a:t>
             </a:fld>
             <a:endParaRPr lang="fr-FR"/>
           </a:p>
@@ -457,7 +457,7 @@
           <a:p>
             <a:fld id="{6D268A9F-5B74-4C7A-8210-6C461655F85B}" type="datetimeFigureOut">
               <a:rPr lang="fr-FR" smtClean="0"/>
-              <a:t>16/06/2025</a:t>
+              <a:t>17/06/2025</a:t>
             </a:fld>
             <a:endParaRPr lang="fr-FR"/>
           </a:p>
@@ -665,7 +665,7 @@
           <a:p>
             <a:fld id="{6D268A9F-5B74-4C7A-8210-6C461655F85B}" type="datetimeFigureOut">
               <a:rPr lang="fr-FR" smtClean="0"/>
-              <a:t>16/06/2025</a:t>
+              <a:t>17/06/2025</a:t>
             </a:fld>
             <a:endParaRPr lang="fr-FR"/>
           </a:p>
@@ -863,7 +863,7 @@
           <a:p>
             <a:fld id="{6D268A9F-5B74-4C7A-8210-6C461655F85B}" type="datetimeFigureOut">
               <a:rPr lang="fr-FR" smtClean="0"/>
-              <a:t>16/06/2025</a:t>
+              <a:t>17/06/2025</a:t>
             </a:fld>
             <a:endParaRPr lang="fr-FR"/>
           </a:p>
@@ -1138,7 +1138,7 @@
           <a:p>
             <a:fld id="{6D268A9F-5B74-4C7A-8210-6C461655F85B}" type="datetimeFigureOut">
               <a:rPr lang="fr-FR" smtClean="0"/>
-              <a:t>16/06/2025</a:t>
+              <a:t>17/06/2025</a:t>
             </a:fld>
             <a:endParaRPr lang="fr-FR"/>
           </a:p>
@@ -1403,7 +1403,7 @@
           <a:p>
             <a:fld id="{6D268A9F-5B74-4C7A-8210-6C461655F85B}" type="datetimeFigureOut">
               <a:rPr lang="fr-FR" smtClean="0"/>
-              <a:t>16/06/2025</a:t>
+              <a:t>17/06/2025</a:t>
             </a:fld>
             <a:endParaRPr lang="fr-FR"/>
           </a:p>
@@ -1815,7 +1815,7 @@
           <a:p>
             <a:fld id="{6D268A9F-5B74-4C7A-8210-6C461655F85B}" type="datetimeFigureOut">
               <a:rPr lang="fr-FR" smtClean="0"/>
-              <a:t>16/06/2025</a:t>
+              <a:t>17/06/2025</a:t>
             </a:fld>
             <a:endParaRPr lang="fr-FR"/>
           </a:p>
@@ -1956,7 +1956,7 @@
           <a:p>
             <a:fld id="{6D268A9F-5B74-4C7A-8210-6C461655F85B}" type="datetimeFigureOut">
               <a:rPr lang="fr-FR" smtClean="0"/>
-              <a:t>16/06/2025</a:t>
+              <a:t>17/06/2025</a:t>
             </a:fld>
             <a:endParaRPr lang="fr-FR"/>
           </a:p>
@@ -2069,7 +2069,7 @@
           <a:p>
             <a:fld id="{6D268A9F-5B74-4C7A-8210-6C461655F85B}" type="datetimeFigureOut">
               <a:rPr lang="fr-FR" smtClean="0"/>
-              <a:t>16/06/2025</a:t>
+              <a:t>17/06/2025</a:t>
             </a:fld>
             <a:endParaRPr lang="fr-FR"/>
           </a:p>
@@ -2380,7 +2380,7 @@
           <a:p>
             <a:fld id="{6D268A9F-5B74-4C7A-8210-6C461655F85B}" type="datetimeFigureOut">
               <a:rPr lang="fr-FR" smtClean="0"/>
-              <a:t>16/06/2025</a:t>
+              <a:t>17/06/2025</a:t>
             </a:fld>
             <a:endParaRPr lang="fr-FR"/>
           </a:p>
@@ -2668,7 +2668,7 @@
           <a:p>
             <a:fld id="{6D268A9F-5B74-4C7A-8210-6C461655F85B}" type="datetimeFigureOut">
               <a:rPr lang="fr-FR" smtClean="0"/>
-              <a:t>16/06/2025</a:t>
+              <a:t>17/06/2025</a:t>
             </a:fld>
             <a:endParaRPr lang="fr-FR"/>
           </a:p>
@@ -2909,7 +2909,7 @@
           <a:p>
             <a:fld id="{6D268A9F-5B74-4C7A-8210-6C461655F85B}" type="datetimeFigureOut">
               <a:rPr lang="fr-FR" smtClean="0"/>
-              <a:t>16/06/2025</a:t>
+              <a:t>17/06/2025</a:t>
             </a:fld>
             <a:endParaRPr lang="fr-FR"/>
           </a:p>
@@ -3326,6 +3326,46 @@
           <a:chExt cx="0" cy="0"/>
         </a:xfrm>
       </p:grpSpPr>
+      <p:pic>
+        <p:nvPicPr>
+          <p:cNvPr id="18" name="Image 17">
+            <a:extLst>
+              <a:ext uri="{FF2B5EF4-FFF2-40B4-BE49-F238E27FC236}">
+                <a16:creationId xmlns:a16="http://schemas.microsoft.com/office/drawing/2014/main" id="{D6B8A6B6-626E-D4F9-BC99-F37CCBED73D1}"/>
+              </a:ext>
+            </a:extLst>
+          </p:cNvPr>
+          <p:cNvPicPr>
+            <a:picLocks noChangeAspect="1"/>
+          </p:cNvPicPr>
+          <p:nvPr/>
+        </p:nvPicPr>
+        <p:blipFill>
+          <a:blip r:embed="rId2" cstate="print">
+            <a:alphaModFix amt="6000"/>
+            <a:extLst>
+              <a:ext uri="{28A0092B-C50C-407E-A947-70E740481C1C}">
+                <a14:useLocalDpi xmlns:a14="http://schemas.microsoft.com/office/drawing/2010/main" val="0"/>
+              </a:ext>
+            </a:extLst>
+          </a:blip>
+          <a:stretch>
+            <a:fillRect/>
+          </a:stretch>
+        </p:blipFill>
+        <p:spPr>
+          <a:xfrm>
+            <a:off x="1756974" y="3349256"/>
+            <a:ext cx="5969519" cy="3164718"/>
+          </a:xfrm>
+          <a:prstGeom prst="rect">
+            <a:avLst/>
+          </a:prstGeom>
+          <a:ln w="12700">
+            <a:noFill/>
+          </a:ln>
+        </p:spPr>
+      </p:pic>
       <p:sp>
         <p:nvSpPr>
           <p:cNvPr id="5" name="Organigramme : Connecteur hors page 2" descr="Drapeau">
@@ -3481,10 +3521,10 @@
           <p:nvPr/>
         </p:nvPicPr>
         <p:blipFill>
-          <a:blip r:embed="rId2">
+          <a:blip r:embed="rId3">
             <a:extLst>
               <a:ext uri="{96DAC541-7B7A-43D3-8B79-37D633B846F1}">
-                <asvg:svgBlip xmlns:asvg="http://schemas.microsoft.com/office/drawing/2016/SVG/main" r:embed="rId3"/>
+                <asvg:svgBlip xmlns:asvg="http://schemas.microsoft.com/office/drawing/2016/SVG/main" r:embed="rId4"/>
               </a:ext>
             </a:extLst>
           </a:blip>
@@ -3504,151 +3544,20 @@
       </p:pic>
       <p:sp>
         <p:nvSpPr>
-          <p:cNvPr id="7" name="Espace réservé du texte 7">
-            <a:extLst>
-              <a:ext uri="{FF2B5EF4-FFF2-40B4-BE49-F238E27FC236}">
-                <a16:creationId xmlns:a16="http://schemas.microsoft.com/office/drawing/2014/main" id="{732DAD5A-357A-7924-C07F-6FDE899EE6F1}"/>
-              </a:ext>
-            </a:extLst>
-          </p:cNvPr>
-          <p:cNvSpPr txBox="1">
-            <a:spLocks/>
-          </p:cNvSpPr>
+          <p:cNvPr id="12" name="ZoneTexte 11">
+            <a:extLst>
+              <a:ext uri="{FF2B5EF4-FFF2-40B4-BE49-F238E27FC236}">
+                <a16:creationId xmlns:a16="http://schemas.microsoft.com/office/drawing/2014/main" id="{8B26B9BD-3607-95DF-1B53-7B504D520F06}"/>
+              </a:ext>
+            </a:extLst>
+          </p:cNvPr>
+          <p:cNvSpPr txBox="1"/>
           <p:nvPr/>
         </p:nvSpPr>
         <p:spPr>
           <a:xfrm>
-            <a:off x="3981579" y="221760"/>
-            <a:ext cx="4228842" cy="625475"/>
-          </a:xfrm>
-          <a:prstGeom prst="rect">
-            <a:avLst/>
-          </a:prstGeom>
-        </p:spPr>
-        <p:txBody>
-          <a:bodyPr vert="horz" lIns="91440" tIns="45720" rIns="91440" bIns="45720" rtlCol="0" anchor="ctr"/>
-          <a:lstStyle>
-            <a:defPPr>
-              <a:defRPr lang="fr-FR"/>
-            </a:defPPr>
-            <a:lvl1pPr marL="0" algn="l" defTabSz="914400" rtl="0" eaLnBrk="1" latinLnBrk="0" hangingPunct="1">
-              <a:defRPr sz="1200" kern="1200">
-                <a:solidFill>
-                  <a:schemeClr val="tx1">
-                    <a:tint val="82000"/>
-                  </a:schemeClr>
-                </a:solidFill>
-                <a:latin typeface="+mn-lt"/>
-                <a:ea typeface="+mn-ea"/>
-                <a:cs typeface="+mn-cs"/>
-              </a:defRPr>
-            </a:lvl1pPr>
-            <a:lvl2pPr marL="457200" algn="l" defTabSz="914400" rtl="0" eaLnBrk="1" latinLnBrk="0" hangingPunct="1">
-              <a:defRPr sz="1800" kern="1200">
-                <a:solidFill>
-                  <a:schemeClr val="tx1"/>
-                </a:solidFill>
-                <a:latin typeface="+mn-lt"/>
-                <a:ea typeface="+mn-ea"/>
-                <a:cs typeface="+mn-cs"/>
-              </a:defRPr>
-            </a:lvl2pPr>
-            <a:lvl3pPr marL="914400" algn="l" defTabSz="914400" rtl="0" eaLnBrk="1" latinLnBrk="0" hangingPunct="1">
-              <a:defRPr sz="1800" kern="1200">
-                <a:solidFill>
-                  <a:schemeClr val="tx1"/>
-                </a:solidFill>
-                <a:latin typeface="+mn-lt"/>
-                <a:ea typeface="+mn-ea"/>
-                <a:cs typeface="+mn-cs"/>
-              </a:defRPr>
-            </a:lvl3pPr>
-            <a:lvl4pPr marL="1371600" algn="l" defTabSz="914400" rtl="0" eaLnBrk="1" latinLnBrk="0" hangingPunct="1">
-              <a:defRPr sz="1800" kern="1200">
-                <a:solidFill>
-                  <a:schemeClr val="tx1"/>
-                </a:solidFill>
-                <a:latin typeface="+mn-lt"/>
-                <a:ea typeface="+mn-ea"/>
-                <a:cs typeface="+mn-cs"/>
-              </a:defRPr>
-            </a:lvl4pPr>
-            <a:lvl5pPr marL="1828800" algn="l" defTabSz="914400" rtl="0" eaLnBrk="1" latinLnBrk="0" hangingPunct="1">
-              <a:defRPr sz="1800" kern="1200">
-                <a:solidFill>
-                  <a:schemeClr val="tx1"/>
-                </a:solidFill>
-                <a:latin typeface="+mn-lt"/>
-                <a:ea typeface="+mn-ea"/>
-                <a:cs typeface="+mn-cs"/>
-              </a:defRPr>
-            </a:lvl5pPr>
-            <a:lvl6pPr marL="2286000" algn="l" defTabSz="914400" rtl="0" eaLnBrk="1" latinLnBrk="0" hangingPunct="1">
-              <a:defRPr sz="1800" kern="1200">
-                <a:solidFill>
-                  <a:schemeClr val="tx1"/>
-                </a:solidFill>
-                <a:latin typeface="+mn-lt"/>
-                <a:ea typeface="+mn-ea"/>
-                <a:cs typeface="+mn-cs"/>
-              </a:defRPr>
-            </a:lvl6pPr>
-            <a:lvl7pPr marL="2743200" algn="l" defTabSz="914400" rtl="0" eaLnBrk="1" latinLnBrk="0" hangingPunct="1">
-              <a:defRPr sz="1800" kern="1200">
-                <a:solidFill>
-                  <a:schemeClr val="tx1"/>
-                </a:solidFill>
-                <a:latin typeface="+mn-lt"/>
-                <a:ea typeface="+mn-ea"/>
-                <a:cs typeface="+mn-cs"/>
-              </a:defRPr>
-            </a:lvl7pPr>
-            <a:lvl8pPr marL="3200400" algn="l" defTabSz="914400" rtl="0" eaLnBrk="1" latinLnBrk="0" hangingPunct="1">
-              <a:defRPr sz="1800" kern="1200">
-                <a:solidFill>
-                  <a:schemeClr val="tx1"/>
-                </a:solidFill>
-                <a:latin typeface="+mn-lt"/>
-                <a:ea typeface="+mn-ea"/>
-                <a:cs typeface="+mn-cs"/>
-              </a:defRPr>
-            </a:lvl8pPr>
-            <a:lvl9pPr marL="3657600" algn="l" defTabSz="914400" rtl="0" eaLnBrk="1" latinLnBrk="0" hangingPunct="1">
-              <a:defRPr sz="1800" kern="1200">
-                <a:solidFill>
-                  <a:schemeClr val="tx1"/>
-                </a:solidFill>
-                <a:latin typeface="+mn-lt"/>
-                <a:ea typeface="+mn-ea"/>
-                <a:cs typeface="+mn-cs"/>
-              </a:defRPr>
-            </a:lvl9pPr>
-          </a:lstStyle>
-          <a:p>
-            <a:pPr algn="ctr"/>
-            <a:r>
-              <a:rPr lang="fr-FR" sz="2000" b="1" dirty="0"/>
-              <a:t>CERTIFICAT DE PARTICIPATION</a:t>
-            </a:r>
-          </a:p>
-        </p:txBody>
-      </p:sp>
-      <p:sp>
-        <p:nvSpPr>
-          <p:cNvPr id="12" name="ZoneTexte 11">
-            <a:extLst>
-              <a:ext uri="{FF2B5EF4-FFF2-40B4-BE49-F238E27FC236}">
-                <a16:creationId xmlns:a16="http://schemas.microsoft.com/office/drawing/2014/main" id="{8B26B9BD-3607-95DF-1B53-7B504D520F06}"/>
-              </a:ext>
-            </a:extLst>
-          </p:cNvPr>
-          <p:cNvSpPr txBox="1"/>
-          <p:nvPr/>
-        </p:nvSpPr>
-        <p:spPr>
-          <a:xfrm>
-            <a:off x="581652" y="1084342"/>
-            <a:ext cx="11028695" cy="1850763"/>
+            <a:off x="457691" y="692525"/>
+            <a:ext cx="11028695" cy="4724498"/>
           </a:xfrm>
           <a:prstGeom prst="rect">
             <a:avLst/>
@@ -3662,6 +3571,29 @@
           <a:lstStyle/>
           <a:p>
             <a:pPr algn="ctr">
+              <a:buNone/>
+            </a:pPr>
+            <a:r>
+              <a:rPr lang="fr-FR" sz="1400" dirty="0">
+                <a:solidFill>
+                  <a:srgbClr val="002060"/>
+                </a:solidFill>
+                <a:effectLst/>
+                <a:latin typeface="Poppins" panose="00000500000000000000" pitchFamily="2" charset="0"/>
+                <a:ea typeface="Aptos" panose="020B0004020202020204" pitchFamily="34" charset="0"/>
+                <a:cs typeface="Times New Roman" panose="02020603050405020304" pitchFamily="18" charset="0"/>
+              </a:rPr>
+              <a:t>Ce certificat est décerné à :</a:t>
+            </a:r>
+            <a:endParaRPr lang="fr-FR" sz="1200" dirty="0">
+              <a:effectLst/>
+              <a:latin typeface="Aptos" panose="020B0004020202020204" pitchFamily="34" charset="0"/>
+              <a:ea typeface="Aptos" panose="020B0004020202020204" pitchFamily="34" charset="0"/>
+              <a:cs typeface="Times New Roman" panose="02020603050405020304" pitchFamily="18" charset="0"/>
+            </a:endParaRPr>
+          </a:p>
+          <a:p>
+            <a:pPr algn="ctr">
               <a:spcAft>
                 <a:spcPts val="1200"/>
               </a:spcAft>
@@ -3670,7 +3602,7 @@
             <a:r>
               <a:rPr lang="fr-CM" sz="8800" b="1" dirty="0">
                 <a:solidFill>
-                  <a:srgbClr val="002060"/>
+                  <a:schemeClr val="accent1"/>
                 </a:solidFill>
                 <a:effectLst/>
                 <a:latin typeface="Palace Script MT" panose="030303020206070C0B05" pitchFamily="66" charset="0"/>
@@ -3680,6 +3612,9 @@
               <a:t>[[VOTRE_BALISE]]</a:t>
             </a:r>
             <a:endParaRPr lang="fr-FR" sz="1100" b="1" dirty="0">
+              <a:solidFill>
+                <a:schemeClr val="accent1"/>
+              </a:solidFill>
               <a:effectLst/>
               <a:latin typeface="Palace Script MT" panose="030303020206070C0B05" pitchFamily="66" charset="0"/>
               <a:ea typeface="Aptos" panose="020B0004020202020204" pitchFamily="34" charset="0"/>
@@ -3696,6 +3631,78 @@
               </a:spcAft>
               <a:buNone/>
             </a:pPr>
+            <a:r>
+              <a:rPr lang="fr-FR" sz="1400" dirty="0">
+                <a:solidFill>
+                  <a:srgbClr val="002060"/>
+                </a:solidFill>
+                <a:effectLst/>
+                <a:latin typeface="Poppins" panose="00000500000000000000" pitchFamily="2" charset="0"/>
+                <a:ea typeface="Aptos" panose="020B0004020202020204" pitchFamily="34" charset="0"/>
+                <a:cs typeface="Times New Roman" panose="02020603050405020304" pitchFamily="18" charset="0"/>
+              </a:rPr>
+              <a:t>en reconnaissance de sa participation active au : Grand Parlement des Enfants Innovateurs organisé par l’association </a:t>
+            </a:r>
+            <a:r>
+              <a:rPr lang="fr-FR" sz="1400" dirty="0" err="1">
+                <a:solidFill>
+                  <a:srgbClr val="002060"/>
+                </a:solidFill>
+                <a:effectLst/>
+                <a:latin typeface="Poppins" panose="00000500000000000000" pitchFamily="2" charset="0"/>
+                <a:ea typeface="Aptos" panose="020B0004020202020204" pitchFamily="34" charset="0"/>
+                <a:cs typeface="Times New Roman" panose="02020603050405020304" pitchFamily="18" charset="0"/>
+              </a:rPr>
+              <a:t>Raise</a:t>
+            </a:r>
+            <a:r>
+              <a:rPr lang="fr-FR" sz="1400" dirty="0">
+                <a:solidFill>
+                  <a:srgbClr val="002060"/>
+                </a:solidFill>
+                <a:effectLst/>
+                <a:latin typeface="Poppins" panose="00000500000000000000" pitchFamily="2" charset="0"/>
+                <a:ea typeface="Aptos" panose="020B0004020202020204" pitchFamily="34" charset="0"/>
+                <a:cs typeface="Times New Roman" panose="02020603050405020304" pitchFamily="18" charset="0"/>
+              </a:rPr>
+              <a:t>-Up </a:t>
+            </a:r>
+            <a:r>
+              <a:rPr lang="fr-FR" sz="1400" dirty="0" err="1">
+                <a:solidFill>
+                  <a:srgbClr val="002060"/>
+                </a:solidFill>
+                <a:effectLst/>
+                <a:latin typeface="Poppins" panose="00000500000000000000" pitchFamily="2" charset="0"/>
+                <a:ea typeface="Aptos" panose="020B0004020202020204" pitchFamily="34" charset="0"/>
+                <a:cs typeface="Times New Roman" panose="02020603050405020304" pitchFamily="18" charset="0"/>
+              </a:rPr>
+              <a:t>Cameroon</a:t>
+            </a:r>
+            <a:r>
+              <a:rPr lang="fr-FR" sz="1400" dirty="0">
+                <a:solidFill>
+                  <a:srgbClr val="002060"/>
+                </a:solidFill>
+                <a:effectLst/>
+                <a:latin typeface="Poppins" panose="00000500000000000000" pitchFamily="2" charset="0"/>
+                <a:ea typeface="Aptos" panose="020B0004020202020204" pitchFamily="34" charset="0"/>
+                <a:cs typeface="Times New Roman" panose="02020603050405020304" pitchFamily="18" charset="0"/>
+              </a:rPr>
+              <a:t>, dans le cadre de La Semaine de l’Enfant Africain Visionnaire</a:t>
+            </a:r>
+            <a:r>
+              <a:rPr lang="en-US" sz="1400" dirty="0">
+                <a:solidFill>
+                  <a:srgbClr val="002060"/>
+                </a:solidFill>
+                <a:effectLst/>
+                <a:latin typeface="Poppins" panose="00000500000000000000" pitchFamily="2" charset="0"/>
+                <a:ea typeface="Aptos" panose="020B0004020202020204" pitchFamily="34" charset="0"/>
+                <a:cs typeface="Times New Roman" panose="02020603050405020304" pitchFamily="18" charset="0"/>
+              </a:rPr>
+              <a:t>.</a:t>
+            </a:r>
             <a:endParaRPr lang="fr-FR" sz="1200" dirty="0">
               <a:effectLst/>
               <a:latin typeface="Aptos" panose="020B0004020202020204" pitchFamily="34" charset="0"/>
@@ -3703,14 +3710,132 @@
               <a:cs typeface="Times New Roman" panose="02020603050405020304" pitchFamily="18" charset="0"/>
             </a:endParaRPr>
           </a:p>
+          <a:p>
+            <a:pPr algn="ctr">
+              <a:lnSpc>
+                <a:spcPct val="150000"/>
+              </a:lnSpc>
+              <a:spcAft>
+                <a:spcPts val="2600"/>
+              </a:spcAft>
+              <a:buNone/>
+            </a:pPr>
+            <a:r>
+              <a:rPr lang="fr-FR" sz="1400" dirty="0">
+                <a:solidFill>
+                  <a:srgbClr val="002060"/>
+                </a:solidFill>
+                <a:effectLst/>
+                <a:latin typeface="Poppins" panose="00000500000000000000" pitchFamily="2" charset="0"/>
+                <a:ea typeface="Aptos" panose="020B0004020202020204" pitchFamily="34" charset="0"/>
+                <a:cs typeface="Times New Roman" panose="02020603050405020304" pitchFamily="18" charset="0"/>
+              </a:rPr>
+              <a:t>Événement tenu le </a:t>
+            </a:r>
+            <a:r>
+              <a:rPr lang="fr-FR" sz="1400" dirty="0">
+                <a:solidFill>
+                  <a:srgbClr val="002060"/>
+                </a:solidFill>
+                <a:latin typeface="Poppins" panose="00000500000000000000" pitchFamily="2" charset="0"/>
+                <a:ea typeface="Aptos" panose="020B0004020202020204" pitchFamily="34" charset="0"/>
+                <a:cs typeface="Times New Roman" panose="02020603050405020304" pitchFamily="18" charset="0"/>
+              </a:rPr>
+              <a:t>21</a:t>
+            </a:r>
+            <a:r>
+              <a:rPr lang="fr-FR" sz="1400" dirty="0">
+                <a:solidFill>
+                  <a:srgbClr val="002060"/>
+                </a:solidFill>
+                <a:effectLst/>
+                <a:latin typeface="Poppins" panose="00000500000000000000" pitchFamily="2" charset="0"/>
+                <a:ea typeface="Aptos" panose="020B0004020202020204" pitchFamily="34" charset="0"/>
+                <a:cs typeface="Times New Roman" panose="02020603050405020304" pitchFamily="18" charset="0"/>
+              </a:rPr>
+              <a:t> juin 2025 à Dakar</a:t>
+            </a:r>
+            <a:r>
+              <a:rPr lang="fr-FR" sz="1400" dirty="0">
+                <a:solidFill>
+                  <a:srgbClr val="002060"/>
+                </a:solidFill>
+                <a:latin typeface="Poppins" panose="00000500000000000000" pitchFamily="2" charset="0"/>
+                <a:ea typeface="Aptos" panose="020B0004020202020204" pitchFamily="34" charset="0"/>
+                <a:cs typeface="Times New Roman" panose="02020603050405020304" pitchFamily="18" charset="0"/>
+              </a:rPr>
+              <a:t>.</a:t>
+            </a:r>
+            <a:endParaRPr lang="fr-FR" sz="1400" dirty="0">
+              <a:solidFill>
+                <a:srgbClr val="002060"/>
+              </a:solidFill>
+              <a:effectLst/>
+              <a:latin typeface="Poppins" panose="00000500000000000000" pitchFamily="2" charset="0"/>
+              <a:ea typeface="Aptos" panose="020B0004020202020204" pitchFamily="34" charset="0"/>
+              <a:cs typeface="Times New Roman" panose="02020603050405020304" pitchFamily="18" charset="0"/>
+            </a:endParaRPr>
+          </a:p>
+          <a:p>
+            <a:pPr algn="ctr">
+              <a:lnSpc>
+                <a:spcPct val="150000"/>
+              </a:lnSpc>
+              <a:spcAft>
+                <a:spcPts val="2600"/>
+              </a:spcAft>
+              <a:buNone/>
+            </a:pPr>
+            <a:r>
+              <a:rPr lang="fr-FR" sz="1400" dirty="0">
+                <a:solidFill>
+                  <a:srgbClr val="002060"/>
+                </a:solidFill>
+                <a:effectLst/>
+                <a:latin typeface="Poppins" panose="00000500000000000000" pitchFamily="2" charset="0"/>
+                <a:ea typeface="Aptos" panose="020B0004020202020204" pitchFamily="34" charset="0"/>
+                <a:cs typeface="Times New Roman" panose="02020603050405020304" pitchFamily="18" charset="0"/>
+              </a:rPr>
+              <a:t>Ce certificat célèbre l’engagement, la créativité et la vision des enfants africains qui construisent l’avenir avec courage, intelligence et espoir. </a:t>
+            </a:r>
+          </a:p>
+          <a:p>
+            <a:pPr algn="ctr">
+              <a:lnSpc>
+                <a:spcPct val="150000"/>
+              </a:lnSpc>
+              <a:spcAft>
+                <a:spcPts val="2600"/>
+              </a:spcAft>
+              <a:buNone/>
+            </a:pPr>
+            <a:r>
+              <a:rPr lang="fr-FR" sz="1400" dirty="0">
+                <a:solidFill>
+                  <a:srgbClr val="002060"/>
+                </a:solidFill>
+                <a:effectLst/>
+                <a:latin typeface="Poppins" panose="00000500000000000000" pitchFamily="2" charset="0"/>
+                <a:ea typeface="Aptos" panose="020B0004020202020204" pitchFamily="34" charset="0"/>
+                <a:cs typeface="Times New Roman" panose="02020603050405020304" pitchFamily="18" charset="0"/>
+              </a:rPr>
+              <a:t>En foi de quoi, le présent certificat lui est décerné pour valoir ce que de droit.</a:t>
+            </a:r>
+            <a:endParaRPr lang="fr-FR" sz="1200" dirty="0">
+              <a:effectLst/>
+              <a:latin typeface="Aptos" panose="020B0004020202020204" pitchFamily="34" charset="0"/>
+              <a:ea typeface="Aptos" panose="020B0004020202020204" pitchFamily="34" charset="0"/>
+              <a:cs typeface="Times New Roman" panose="02020603050405020304" pitchFamily="18" charset="0"/>
+            </a:endParaRPr>
+          </a:p>
         </p:txBody>
       </p:sp>
       <p:pic>
         <p:nvPicPr>
-          <p:cNvPr id="2" name="Graphique 1">
-            <a:extLst>
-              <a:ext uri="{FF2B5EF4-FFF2-40B4-BE49-F238E27FC236}">
-                <a16:creationId xmlns:a16="http://schemas.microsoft.com/office/drawing/2014/main" id="{12FFC140-76B7-7705-BCA2-492B4ECAF968}"/>
+          <p:cNvPr id="13" name="Image 12">
+            <a:extLst>
+              <a:ext uri="{FF2B5EF4-FFF2-40B4-BE49-F238E27FC236}">
+                <a16:creationId xmlns:a16="http://schemas.microsoft.com/office/drawing/2014/main" id="{9C5D4847-A45F-7881-95D2-4F09E4257692}"/>
               </a:ext>
             </a:extLst>
           </p:cNvPr>
@@ -3720,11 +3845,50 @@
           <p:nvPr/>
         </p:nvPicPr>
         <p:blipFill>
-          <a:blip r:embed="rId4">
+          <a:blip r:embed="rId2" cstate="print">
+            <a:extLst>
+              <a:ext uri="{28A0092B-C50C-407E-A947-70E740481C1C}">
+                <a14:useLocalDpi xmlns:a14="http://schemas.microsoft.com/office/drawing/2010/main" val="0"/>
+              </a:ext>
+            </a:extLst>
+          </a:blip>
+          <a:stretch>
+            <a:fillRect/>
+          </a:stretch>
+        </p:blipFill>
+        <p:spPr>
+          <a:xfrm>
+            <a:off x="9830442" y="109312"/>
+            <a:ext cx="1779905" cy="943610"/>
+          </a:xfrm>
+          <a:prstGeom prst="rect">
+            <a:avLst/>
+          </a:prstGeom>
+          <a:ln w="12700">
+            <a:noFill/>
+          </a:ln>
+        </p:spPr>
+      </p:pic>
+      <p:pic>
+        <p:nvPicPr>
+          <p:cNvPr id="17" name="Graphique 16">
+            <a:extLst>
+              <a:ext uri="{FF2B5EF4-FFF2-40B4-BE49-F238E27FC236}">
+                <a16:creationId xmlns:a16="http://schemas.microsoft.com/office/drawing/2014/main" id="{12FFC140-76B7-7705-BCA2-492B4ECAF968}"/>
+              </a:ext>
+            </a:extLst>
+          </p:cNvPr>
+          <p:cNvPicPr>
+            <a:picLocks noChangeAspect="1"/>
+          </p:cNvPicPr>
+          <p:nvPr/>
+        </p:nvPicPr>
+        <p:blipFill>
+          <a:blip r:embed="rId5">
             <a:alphaModFix amt="39000"/>
             <a:extLst>
               <a:ext uri="{96DAC541-7B7A-43D3-8B79-37D633B846F1}">
-                <asvg:svgBlip xmlns:asvg="http://schemas.microsoft.com/office/drawing/2016/SVG/main" r:embed="rId5"/>
+                <asvg:svgBlip xmlns:asvg="http://schemas.microsoft.com/office/drawing/2016/SVG/main" r:embed="rId6"/>
               </a:ext>
             </a:extLst>
           </a:blip>
@@ -3736,6 +3900,755 @@
           <a:xfrm>
             <a:off x="-6040280" y="2107260"/>
             <a:ext cx="14185929" cy="7640959"/>
+          </a:xfrm>
+          <a:prstGeom prst="rect">
+            <a:avLst/>
+          </a:prstGeom>
+        </p:spPr>
+      </p:pic>
+      <p:sp>
+        <p:nvSpPr>
+          <p:cNvPr id="20" name="ZoneTexte 19">
+            <a:extLst>
+              <a:ext uri="{FF2B5EF4-FFF2-40B4-BE49-F238E27FC236}">
+                <a16:creationId xmlns:a16="http://schemas.microsoft.com/office/drawing/2014/main" id="{5EA630F9-FB50-29B2-5680-ACC4B8558225}"/>
+              </a:ext>
+            </a:extLst>
+          </p:cNvPr>
+          <p:cNvSpPr txBox="1"/>
+          <p:nvPr/>
+        </p:nvSpPr>
+        <p:spPr>
+          <a:xfrm>
+            <a:off x="492305" y="6127795"/>
+            <a:ext cx="2132424" cy="200055"/>
+          </a:xfrm>
+          <a:prstGeom prst="rect">
+            <a:avLst/>
+          </a:prstGeom>
+          <a:noFill/>
+        </p:spPr>
+        <p:txBody>
+          <a:bodyPr wrap="square">
+            <a:spAutoFit/>
+          </a:bodyPr>
+          <a:lstStyle/>
+          <a:p>
+            <a:r>
+              <a:rPr lang="fr-FR" sz="700" b="1" dirty="0">
+                <a:solidFill>
+                  <a:srgbClr val="002060"/>
+                </a:solidFill>
+                <a:latin typeface="Poppins" panose="00000500000000000000" pitchFamily="2" charset="0"/>
+                <a:cs typeface="Times New Roman" panose="02020603050405020304" pitchFamily="18" charset="0"/>
+              </a:rPr>
+              <a:t>E-mail </a:t>
+            </a:r>
+            <a:r>
+              <a:rPr lang="fr-FR" sz="700" dirty="0">
+                <a:solidFill>
+                  <a:srgbClr val="002060"/>
+                </a:solidFill>
+                <a:latin typeface="Poppins" panose="00000500000000000000" pitchFamily="2" charset="0"/>
+                <a:cs typeface="Times New Roman" panose="02020603050405020304" pitchFamily="18" charset="0"/>
+              </a:rPr>
+              <a:t>: raiseup.cameroon@gmail.com</a:t>
+            </a:r>
+          </a:p>
+        </p:txBody>
+      </p:sp>
+      <p:sp>
+        <p:nvSpPr>
+          <p:cNvPr id="22" name="ZoneTexte 21">
+            <a:extLst>
+              <a:ext uri="{FF2B5EF4-FFF2-40B4-BE49-F238E27FC236}">
+                <a16:creationId xmlns:a16="http://schemas.microsoft.com/office/drawing/2014/main" id="{D90EA1F5-77F9-F522-1F0D-E964B4818429}"/>
+              </a:ext>
+            </a:extLst>
+          </p:cNvPr>
+          <p:cNvSpPr txBox="1"/>
+          <p:nvPr/>
+        </p:nvSpPr>
+        <p:spPr>
+          <a:xfrm>
+            <a:off x="492305" y="6327850"/>
+            <a:ext cx="1796605" cy="200055"/>
+          </a:xfrm>
+          <a:prstGeom prst="rect">
+            <a:avLst/>
+          </a:prstGeom>
+          <a:noFill/>
+        </p:spPr>
+        <p:txBody>
+          <a:bodyPr wrap="square">
+            <a:spAutoFit/>
+          </a:bodyPr>
+          <a:lstStyle/>
+          <a:p>
+            <a:r>
+              <a:rPr lang="fr-FR" sz="700" b="1" dirty="0">
+                <a:solidFill>
+                  <a:srgbClr val="002060"/>
+                </a:solidFill>
+                <a:latin typeface="Poppins" panose="00000500000000000000" pitchFamily="2" charset="0"/>
+                <a:cs typeface="Times New Roman" panose="02020603050405020304" pitchFamily="18" charset="0"/>
+              </a:rPr>
+              <a:t>LinkedIn</a:t>
+            </a:r>
+            <a:r>
+              <a:rPr lang="fr-FR" sz="700" dirty="0">
+                <a:solidFill>
+                  <a:srgbClr val="002060"/>
+                </a:solidFill>
+                <a:latin typeface="Poppins" panose="00000500000000000000" pitchFamily="2" charset="0"/>
+                <a:cs typeface="Times New Roman" panose="02020603050405020304" pitchFamily="18" charset="0"/>
+              </a:rPr>
+              <a:t> : @raise-up-cameroon</a:t>
+            </a:r>
+          </a:p>
+        </p:txBody>
+      </p:sp>
+      <p:sp>
+        <p:nvSpPr>
+          <p:cNvPr id="23" name="ZoneTexte 22">
+            <a:extLst>
+              <a:ext uri="{FF2B5EF4-FFF2-40B4-BE49-F238E27FC236}">
+                <a16:creationId xmlns:a16="http://schemas.microsoft.com/office/drawing/2014/main" id="{F8BE8EFA-9BAB-DD7C-A297-94C4D4866644}"/>
+              </a:ext>
+            </a:extLst>
+          </p:cNvPr>
+          <p:cNvSpPr txBox="1"/>
+          <p:nvPr/>
+        </p:nvSpPr>
+        <p:spPr>
+          <a:xfrm>
+            <a:off x="2314431" y="6327850"/>
+            <a:ext cx="2132424" cy="200055"/>
+          </a:xfrm>
+          <a:prstGeom prst="rect">
+            <a:avLst/>
+          </a:prstGeom>
+          <a:noFill/>
+        </p:spPr>
+        <p:txBody>
+          <a:bodyPr wrap="square">
+            <a:spAutoFit/>
+          </a:bodyPr>
+          <a:lstStyle/>
+          <a:p>
+            <a:r>
+              <a:rPr lang="fr-FR" sz="700" b="1" dirty="0">
+                <a:solidFill>
+                  <a:srgbClr val="002060"/>
+                </a:solidFill>
+                <a:latin typeface="Poppins" panose="00000500000000000000" pitchFamily="2" charset="0"/>
+                <a:cs typeface="Times New Roman" panose="02020603050405020304" pitchFamily="18" charset="0"/>
+              </a:rPr>
+              <a:t>Instagram </a:t>
+            </a:r>
+            <a:r>
+              <a:rPr lang="fr-FR" sz="700" dirty="0">
+                <a:solidFill>
+                  <a:srgbClr val="002060"/>
+                </a:solidFill>
+                <a:latin typeface="Poppins" panose="00000500000000000000" pitchFamily="2" charset="0"/>
+                <a:cs typeface="Times New Roman" panose="02020603050405020304" pitchFamily="18" charset="0"/>
+              </a:rPr>
+              <a:t>: @raise_up_cmr</a:t>
+            </a:r>
+          </a:p>
+        </p:txBody>
+      </p:sp>
+      <p:sp>
+        <p:nvSpPr>
+          <p:cNvPr id="24" name="ZoneTexte 23">
+            <a:extLst>
+              <a:ext uri="{FF2B5EF4-FFF2-40B4-BE49-F238E27FC236}">
+                <a16:creationId xmlns:a16="http://schemas.microsoft.com/office/drawing/2014/main" id="{DE035740-45DD-B636-1F3D-0C53CC790E31}"/>
+              </a:ext>
+            </a:extLst>
+          </p:cNvPr>
+          <p:cNvSpPr txBox="1"/>
+          <p:nvPr/>
+        </p:nvSpPr>
+        <p:spPr>
+          <a:xfrm>
+            <a:off x="2314431" y="6118591"/>
+            <a:ext cx="2132424" cy="200055"/>
+          </a:xfrm>
+          <a:prstGeom prst="rect">
+            <a:avLst/>
+          </a:prstGeom>
+          <a:noFill/>
+        </p:spPr>
+        <p:txBody>
+          <a:bodyPr wrap="square">
+            <a:spAutoFit/>
+          </a:bodyPr>
+          <a:lstStyle/>
+          <a:p>
+            <a:r>
+              <a:rPr lang="fr-FR" sz="700" b="1" dirty="0">
+                <a:solidFill>
+                  <a:srgbClr val="002060"/>
+                </a:solidFill>
+                <a:latin typeface="Poppins" panose="00000500000000000000" pitchFamily="2" charset="0"/>
+                <a:cs typeface="Times New Roman" panose="02020603050405020304" pitchFamily="18" charset="0"/>
+              </a:rPr>
+              <a:t>Facebook </a:t>
+            </a:r>
+            <a:r>
+              <a:rPr lang="fr-FR" sz="700" dirty="0">
+                <a:solidFill>
+                  <a:srgbClr val="002060"/>
+                </a:solidFill>
+                <a:latin typeface="Poppins" panose="00000500000000000000" pitchFamily="2" charset="0"/>
+                <a:cs typeface="Times New Roman" panose="02020603050405020304" pitchFamily="18" charset="0"/>
+              </a:rPr>
+              <a:t>: @Raise-Up-Cameroon</a:t>
+            </a:r>
+          </a:p>
+        </p:txBody>
+      </p:sp>
+      <p:pic>
+        <p:nvPicPr>
+          <p:cNvPr id="26" name="Image 25">
+            <a:extLst>
+              <a:ext uri="{FF2B5EF4-FFF2-40B4-BE49-F238E27FC236}">
+                <a16:creationId xmlns:a16="http://schemas.microsoft.com/office/drawing/2014/main" id="{DD057DE3-B433-4A88-6E60-86D55FED7285}"/>
+              </a:ext>
+            </a:extLst>
+          </p:cNvPr>
+          <p:cNvPicPr>
+            <a:picLocks noChangeAspect="1"/>
+          </p:cNvPicPr>
+          <p:nvPr/>
+        </p:nvPicPr>
+        <p:blipFill>
+          <a:blip r:embed="rId7">
+            <a:extLst>
+              <a:ext uri="{28A0092B-C50C-407E-A947-70E740481C1C}">
+                <a14:useLocalDpi xmlns:a14="http://schemas.microsoft.com/office/drawing/2010/main" val="0"/>
+              </a:ext>
+            </a:extLst>
+          </a:blip>
+          <a:srcRect/>
+          <a:stretch/>
+        </p:blipFill>
+        <p:spPr>
+          <a:xfrm>
+            <a:off x="6229729" y="6042468"/>
+            <a:ext cx="651158" cy="649489"/>
+          </a:xfrm>
+          <a:prstGeom prst="rect">
+            <a:avLst/>
+          </a:prstGeom>
+        </p:spPr>
+      </p:pic>
+      <p:sp>
+        <p:nvSpPr>
+          <p:cNvPr id="2" name="Espace réservé du texte 7">
+            <a:extLst>
+              <a:ext uri="{FF2B5EF4-FFF2-40B4-BE49-F238E27FC236}">
+                <a16:creationId xmlns:a16="http://schemas.microsoft.com/office/drawing/2014/main" id="{7B71FFAD-1311-3B9A-8C83-442F36BC8899}"/>
+              </a:ext>
+            </a:extLst>
+          </p:cNvPr>
+          <p:cNvSpPr txBox="1">
+            <a:spLocks/>
+          </p:cNvSpPr>
+          <p:nvPr/>
+        </p:nvSpPr>
+        <p:spPr>
+          <a:xfrm>
+            <a:off x="2039809" y="191186"/>
+            <a:ext cx="7864457" cy="625475"/>
+          </a:xfrm>
+          <a:prstGeom prst="rect">
+            <a:avLst/>
+          </a:prstGeom>
+        </p:spPr>
+        <p:txBody>
+          <a:bodyPr vert="horz" lIns="91440" tIns="45720" rIns="91440" bIns="45720" rtlCol="0" anchor="ctr"/>
+          <a:lstStyle>
+            <a:defPPr>
+              <a:defRPr lang="fr-FR"/>
+            </a:defPPr>
+            <a:lvl1pPr marL="0" algn="l" defTabSz="914400" rtl="0" eaLnBrk="1" latinLnBrk="0" hangingPunct="1">
+              <a:defRPr sz="1200" kern="1200">
+                <a:solidFill>
+                  <a:schemeClr val="tx1">
+                    <a:tint val="82000"/>
+                  </a:schemeClr>
+                </a:solidFill>
+                <a:latin typeface="+mn-lt"/>
+                <a:ea typeface="+mn-ea"/>
+                <a:cs typeface="+mn-cs"/>
+              </a:defRPr>
+            </a:lvl1pPr>
+            <a:lvl2pPr marL="457200" algn="l" defTabSz="914400" rtl="0" eaLnBrk="1" latinLnBrk="0" hangingPunct="1">
+              <a:defRPr sz="1800" kern="1200">
+                <a:solidFill>
+                  <a:schemeClr val="tx1"/>
+                </a:solidFill>
+                <a:latin typeface="+mn-lt"/>
+                <a:ea typeface="+mn-ea"/>
+                <a:cs typeface="+mn-cs"/>
+              </a:defRPr>
+            </a:lvl2pPr>
+            <a:lvl3pPr marL="914400" algn="l" defTabSz="914400" rtl="0" eaLnBrk="1" latinLnBrk="0" hangingPunct="1">
+              <a:defRPr sz="1800" kern="1200">
+                <a:solidFill>
+                  <a:schemeClr val="tx1"/>
+                </a:solidFill>
+                <a:latin typeface="+mn-lt"/>
+                <a:ea typeface="+mn-ea"/>
+                <a:cs typeface="+mn-cs"/>
+              </a:defRPr>
+            </a:lvl3pPr>
+            <a:lvl4pPr marL="1371600" algn="l" defTabSz="914400" rtl="0" eaLnBrk="1" latinLnBrk="0" hangingPunct="1">
+              <a:defRPr sz="1800" kern="1200">
+                <a:solidFill>
+                  <a:schemeClr val="tx1"/>
+                </a:solidFill>
+                <a:latin typeface="+mn-lt"/>
+                <a:ea typeface="+mn-ea"/>
+                <a:cs typeface="+mn-cs"/>
+              </a:defRPr>
+            </a:lvl4pPr>
+            <a:lvl5pPr marL="1828800" algn="l" defTabSz="914400" rtl="0" eaLnBrk="1" latinLnBrk="0" hangingPunct="1">
+              <a:defRPr sz="1800" kern="1200">
+                <a:solidFill>
+                  <a:schemeClr val="tx1"/>
+                </a:solidFill>
+                <a:latin typeface="+mn-lt"/>
+                <a:ea typeface="+mn-ea"/>
+                <a:cs typeface="+mn-cs"/>
+              </a:defRPr>
+            </a:lvl5pPr>
+            <a:lvl6pPr marL="2286000" algn="l" defTabSz="914400" rtl="0" eaLnBrk="1" latinLnBrk="0" hangingPunct="1">
+              <a:defRPr sz="1800" kern="1200">
+                <a:solidFill>
+                  <a:schemeClr val="tx1"/>
+                </a:solidFill>
+                <a:latin typeface="+mn-lt"/>
+                <a:ea typeface="+mn-ea"/>
+                <a:cs typeface="+mn-cs"/>
+              </a:defRPr>
+            </a:lvl6pPr>
+            <a:lvl7pPr marL="2743200" algn="l" defTabSz="914400" rtl="0" eaLnBrk="1" latinLnBrk="0" hangingPunct="1">
+              <a:defRPr sz="1800" kern="1200">
+                <a:solidFill>
+                  <a:schemeClr val="tx1"/>
+                </a:solidFill>
+                <a:latin typeface="+mn-lt"/>
+                <a:ea typeface="+mn-ea"/>
+                <a:cs typeface="+mn-cs"/>
+              </a:defRPr>
+            </a:lvl7pPr>
+            <a:lvl8pPr marL="3200400" algn="l" defTabSz="914400" rtl="0" eaLnBrk="1" latinLnBrk="0" hangingPunct="1">
+              <a:defRPr sz="1800" kern="1200">
+                <a:solidFill>
+                  <a:schemeClr val="tx1"/>
+                </a:solidFill>
+                <a:latin typeface="+mn-lt"/>
+                <a:ea typeface="+mn-ea"/>
+                <a:cs typeface="+mn-cs"/>
+              </a:defRPr>
+            </a:lvl8pPr>
+            <a:lvl9pPr marL="3657600" algn="l" defTabSz="914400" rtl="0" eaLnBrk="1" latinLnBrk="0" hangingPunct="1">
+              <a:defRPr sz="1800" kern="1200">
+                <a:solidFill>
+                  <a:schemeClr val="tx1"/>
+                </a:solidFill>
+                <a:latin typeface="+mn-lt"/>
+                <a:ea typeface="+mn-ea"/>
+                <a:cs typeface="+mn-cs"/>
+              </a:defRPr>
+            </a:lvl9pPr>
+          </a:lstStyle>
+          <a:p>
+            <a:pPr algn="ctr"/>
+            <a:r>
+              <a:rPr lang="fr-FR" sz="2000" b="1" dirty="0"/>
+              <a:t>CERTIFICAT DE PARTICIPATION</a:t>
+            </a:r>
+          </a:p>
+        </p:txBody>
+      </p:sp>
+      <p:sp>
+        <p:nvSpPr>
+          <p:cNvPr id="4" name="ZoneTexte 3">
+            <a:extLst>
+              <a:ext uri="{FF2B5EF4-FFF2-40B4-BE49-F238E27FC236}">
+                <a16:creationId xmlns:a16="http://schemas.microsoft.com/office/drawing/2014/main" id="{0282FCE9-4E64-A339-21F1-E19E75558307}"/>
+              </a:ext>
+            </a:extLst>
+          </p:cNvPr>
+          <p:cNvSpPr txBox="1"/>
+          <p:nvPr/>
+        </p:nvSpPr>
+        <p:spPr>
+          <a:xfrm>
+            <a:off x="506559" y="5927740"/>
+            <a:ext cx="8149854" cy="215444"/>
+          </a:xfrm>
+          <a:prstGeom prst="rect">
+            <a:avLst/>
+          </a:prstGeom>
+          <a:noFill/>
+        </p:spPr>
+        <p:txBody>
+          <a:bodyPr wrap="square">
+            <a:spAutoFit/>
+          </a:bodyPr>
+          <a:lstStyle/>
+          <a:p>
+            <a:r>
+              <a:rPr lang="fr-FR" sz="800" dirty="0">
+                <a:solidFill>
+                  <a:srgbClr val="002060"/>
+                </a:solidFill>
+                <a:latin typeface="Poppins" panose="00000500000000000000" pitchFamily="2" charset="0"/>
+                <a:cs typeface="Times New Roman" panose="02020603050405020304" pitchFamily="18" charset="0"/>
+              </a:rPr>
+              <a:t>RECEIPISSE DE DECLARATION D'ASSOCIATION N° 00001704 /RDA/J06/SAAJPIBAPP du 03 NOV. 2023</a:t>
+            </a:r>
+          </a:p>
+        </p:txBody>
+      </p:sp>
+      <p:sp>
+        <p:nvSpPr>
+          <p:cNvPr id="3" name="Espace réservé du texte 87">
+            <a:extLst>
+              <a:ext uri="{FF2B5EF4-FFF2-40B4-BE49-F238E27FC236}">
+                <a16:creationId xmlns:a16="http://schemas.microsoft.com/office/drawing/2014/main" id="{7DB60DDA-31D6-F3FB-BA50-A6678EDE6398}"/>
+              </a:ext>
+            </a:extLst>
+          </p:cNvPr>
+          <p:cNvSpPr txBox="1">
+            <a:spLocks/>
+          </p:cNvSpPr>
+          <p:nvPr/>
+        </p:nvSpPr>
+        <p:spPr>
+          <a:xfrm>
+            <a:off x="6906463" y="5992348"/>
+            <a:ext cx="4756763" cy="757847"/>
+          </a:xfrm>
+          <a:prstGeom prst="rect">
+            <a:avLst/>
+          </a:prstGeom>
+        </p:spPr>
+        <p:txBody>
+          <a:bodyPr rtlCol="0"/>
+          <a:lstStyle>
+            <a:defPPr>
+              <a:defRPr lang="fr-FR"/>
+            </a:defPPr>
+            <a:lvl1pPr marL="228600" indent="-228600" algn="l" defTabSz="914400" rtl="0" eaLnBrk="1" latinLnBrk="0" hangingPunct="1">
+              <a:lnSpc>
+                <a:spcPct val="90000"/>
+              </a:lnSpc>
+              <a:spcBef>
+                <a:spcPts val="1000"/>
+              </a:spcBef>
+              <a:buFont typeface="Arial" panose="020B0604020202020204" pitchFamily="34" charset="0"/>
+              <a:buChar char="•"/>
+              <a:defRPr sz="2800" kern="1200">
+                <a:solidFill>
+                  <a:schemeClr val="tx1"/>
+                </a:solidFill>
+                <a:latin typeface="+mn-lt"/>
+                <a:ea typeface="+mn-ea"/>
+                <a:cs typeface="+mn-cs"/>
+              </a:defRPr>
+            </a:lvl1pPr>
+            <a:lvl2pPr marL="685800" indent="-228600" algn="l" defTabSz="914400" rtl="0" eaLnBrk="1" latinLnBrk="0" hangingPunct="1">
+              <a:lnSpc>
+                <a:spcPct val="90000"/>
+              </a:lnSpc>
+              <a:spcBef>
+                <a:spcPts val="500"/>
+              </a:spcBef>
+              <a:buFont typeface="Arial" panose="020B0604020202020204" pitchFamily="34" charset="0"/>
+              <a:buChar char="•"/>
+              <a:defRPr sz="2400" kern="1200">
+                <a:solidFill>
+                  <a:schemeClr val="tx1"/>
+                </a:solidFill>
+                <a:latin typeface="+mn-lt"/>
+                <a:ea typeface="+mn-ea"/>
+                <a:cs typeface="+mn-cs"/>
+              </a:defRPr>
+            </a:lvl2pPr>
+            <a:lvl3pPr marL="1143000" indent="-228600" algn="l" defTabSz="914400" rtl="0" eaLnBrk="1" latinLnBrk="0" hangingPunct="1">
+              <a:lnSpc>
+                <a:spcPct val="90000"/>
+              </a:lnSpc>
+              <a:spcBef>
+                <a:spcPts val="500"/>
+              </a:spcBef>
+              <a:buFont typeface="Arial" panose="020B0604020202020204" pitchFamily="34" charset="0"/>
+              <a:buChar char="•"/>
+              <a:defRPr sz="2000" kern="1200">
+                <a:solidFill>
+                  <a:schemeClr val="tx1"/>
+                </a:solidFill>
+                <a:latin typeface="+mn-lt"/>
+                <a:ea typeface="+mn-ea"/>
+                <a:cs typeface="+mn-cs"/>
+              </a:defRPr>
+            </a:lvl3pPr>
+            <a:lvl4pPr marL="1600200" indent="-228600" algn="l" defTabSz="914400" rtl="0" eaLnBrk="1" latinLnBrk="0" hangingPunct="1">
+              <a:lnSpc>
+                <a:spcPct val="90000"/>
+              </a:lnSpc>
+              <a:spcBef>
+                <a:spcPts val="500"/>
+              </a:spcBef>
+              <a:buFont typeface="Arial" panose="020B0604020202020204" pitchFamily="34" charset="0"/>
+              <a:buChar char="•"/>
+              <a:defRPr sz="1800" kern="1200">
+                <a:solidFill>
+                  <a:schemeClr val="tx1"/>
+                </a:solidFill>
+                <a:latin typeface="+mn-lt"/>
+                <a:ea typeface="+mn-ea"/>
+                <a:cs typeface="+mn-cs"/>
+              </a:defRPr>
+            </a:lvl4pPr>
+            <a:lvl5pPr marL="2057400" indent="-228600" algn="l" defTabSz="914400" rtl="0" eaLnBrk="1" latinLnBrk="0" hangingPunct="1">
+              <a:lnSpc>
+                <a:spcPct val="90000"/>
+              </a:lnSpc>
+              <a:spcBef>
+                <a:spcPts val="500"/>
+              </a:spcBef>
+              <a:buFont typeface="Arial" panose="020B0604020202020204" pitchFamily="34" charset="0"/>
+              <a:buChar char="•"/>
+              <a:defRPr sz="1800" kern="1200">
+                <a:solidFill>
+                  <a:schemeClr val="tx1"/>
+                </a:solidFill>
+                <a:latin typeface="+mn-lt"/>
+                <a:ea typeface="+mn-ea"/>
+                <a:cs typeface="+mn-cs"/>
+              </a:defRPr>
+            </a:lvl5pPr>
+            <a:lvl6pPr marL="2514600" indent="-228600" algn="l" defTabSz="914400" rtl="0" eaLnBrk="1" latinLnBrk="0" hangingPunct="1">
+              <a:lnSpc>
+                <a:spcPct val="90000"/>
+              </a:lnSpc>
+              <a:spcBef>
+                <a:spcPts val="500"/>
+              </a:spcBef>
+              <a:buFont typeface="Arial" panose="020B0604020202020204" pitchFamily="34" charset="0"/>
+              <a:buChar char="•"/>
+              <a:defRPr sz="1800" kern="1200">
+                <a:solidFill>
+                  <a:schemeClr val="tx1"/>
+                </a:solidFill>
+                <a:latin typeface="+mn-lt"/>
+                <a:ea typeface="+mn-ea"/>
+                <a:cs typeface="+mn-cs"/>
+              </a:defRPr>
+            </a:lvl6pPr>
+            <a:lvl7pPr marL="2971800" indent="-228600" algn="l" defTabSz="914400" rtl="0" eaLnBrk="1" latinLnBrk="0" hangingPunct="1">
+              <a:lnSpc>
+                <a:spcPct val="90000"/>
+              </a:lnSpc>
+              <a:spcBef>
+                <a:spcPts val="500"/>
+              </a:spcBef>
+              <a:buFont typeface="Arial" panose="020B0604020202020204" pitchFamily="34" charset="0"/>
+              <a:buChar char="•"/>
+              <a:defRPr sz="1800" kern="1200">
+                <a:solidFill>
+                  <a:schemeClr val="tx1"/>
+                </a:solidFill>
+                <a:latin typeface="+mn-lt"/>
+                <a:ea typeface="+mn-ea"/>
+                <a:cs typeface="+mn-cs"/>
+              </a:defRPr>
+            </a:lvl7pPr>
+            <a:lvl8pPr marL="3429000" indent="-228600" algn="l" defTabSz="914400" rtl="0" eaLnBrk="1" latinLnBrk="0" hangingPunct="1">
+              <a:lnSpc>
+                <a:spcPct val="90000"/>
+              </a:lnSpc>
+              <a:spcBef>
+                <a:spcPts val="500"/>
+              </a:spcBef>
+              <a:buFont typeface="Arial" panose="020B0604020202020204" pitchFamily="34" charset="0"/>
+              <a:buChar char="•"/>
+              <a:defRPr sz="1800" kern="1200">
+                <a:solidFill>
+                  <a:schemeClr val="tx1"/>
+                </a:solidFill>
+                <a:latin typeface="+mn-lt"/>
+                <a:ea typeface="+mn-ea"/>
+                <a:cs typeface="+mn-cs"/>
+              </a:defRPr>
+            </a:lvl8pPr>
+            <a:lvl9pPr marL="3886200" indent="-228600" algn="l" defTabSz="914400" rtl="0" eaLnBrk="1" latinLnBrk="0" hangingPunct="1">
+              <a:lnSpc>
+                <a:spcPct val="90000"/>
+              </a:lnSpc>
+              <a:spcBef>
+                <a:spcPts val="500"/>
+              </a:spcBef>
+              <a:buFont typeface="Arial" panose="020B0604020202020204" pitchFamily="34" charset="0"/>
+              <a:buChar char="•"/>
+              <a:defRPr sz="1800" kern="1200">
+                <a:solidFill>
+                  <a:schemeClr val="tx1"/>
+                </a:solidFill>
+                <a:latin typeface="+mn-lt"/>
+                <a:ea typeface="+mn-ea"/>
+                <a:cs typeface="+mn-cs"/>
+              </a:defRPr>
+            </a:lvl9pPr>
+          </a:lstStyle>
+          <a:p>
+            <a:pPr>
+              <a:buNone/>
+            </a:pPr>
+            <a:endParaRPr lang="fr-FR" sz="1000" dirty="0">
+              <a:solidFill>
+                <a:srgbClr val="002060"/>
+              </a:solidFill>
+              <a:latin typeface="Poppins" panose="00000500000000000000" pitchFamily="2" charset="0"/>
+              <a:cs typeface="Times New Roman" panose="02020603050405020304" pitchFamily="18" charset="0"/>
+            </a:endParaRPr>
+          </a:p>
+          <a:p>
+            <a:pPr>
+              <a:buNone/>
+            </a:pPr>
+            <a:endParaRPr lang="fr-FR" sz="1000" dirty="0">
+              <a:solidFill>
+                <a:srgbClr val="002060"/>
+              </a:solidFill>
+              <a:latin typeface="Poppins" panose="00000500000000000000" pitchFamily="2" charset="0"/>
+              <a:cs typeface="Times New Roman" panose="02020603050405020304" pitchFamily="18" charset="0"/>
+            </a:endParaRPr>
+          </a:p>
+          <a:p>
+            <a:pPr>
+              <a:buNone/>
+            </a:pPr>
+            <a:r>
+              <a:rPr lang="fr-FR" sz="1000" dirty="0">
+                <a:solidFill>
+                  <a:srgbClr val="002060"/>
+                </a:solidFill>
+                <a:latin typeface="Poppins" panose="00000500000000000000" pitchFamily="2" charset="0"/>
+                <a:cs typeface="Times New Roman" panose="02020603050405020304" pitchFamily="18" charset="0"/>
+              </a:rPr>
+              <a:t>Fait à Dakar le 21/06/2025</a:t>
+            </a:r>
+          </a:p>
+        </p:txBody>
+      </p:sp>
+      <p:pic>
+        <p:nvPicPr>
+          <p:cNvPr id="7" name="Image 6" descr="Une image contenant logo, cercle, Marque, Emblème&#10;&#10;Le contenu généré par l’IA peut être incorrect.">
+            <a:extLst>
+              <a:ext uri="{FF2B5EF4-FFF2-40B4-BE49-F238E27FC236}">
+                <a16:creationId xmlns:a16="http://schemas.microsoft.com/office/drawing/2014/main" id="{8DF64717-3737-11C3-1206-7A155EA3F71B}"/>
+              </a:ext>
+            </a:extLst>
+          </p:cNvPr>
+          <p:cNvPicPr>
+            <a:picLocks noChangeAspect="1"/>
+          </p:cNvPicPr>
+          <p:nvPr/>
+        </p:nvPicPr>
+        <p:blipFill>
+          <a:blip r:embed="rId8">
+            <a:extLst>
+              <a:ext uri="{28A0092B-C50C-407E-A947-70E740481C1C}">
+                <a14:useLocalDpi xmlns:a14="http://schemas.microsoft.com/office/drawing/2010/main" val="0"/>
+              </a:ext>
+            </a:extLst>
+          </a:blip>
+          <a:srcRect l="14789" t="23644" r="17430" b="26336"/>
+          <a:stretch/>
+        </p:blipFill>
+        <p:spPr>
+          <a:xfrm>
+            <a:off x="9340346" y="4450192"/>
+            <a:ext cx="2070288" cy="2035870"/>
+          </a:xfrm>
+          <a:prstGeom prst="rect">
+            <a:avLst/>
+          </a:prstGeom>
+        </p:spPr>
+      </p:pic>
+      <p:pic>
+        <p:nvPicPr>
+          <p:cNvPr id="8" name="Image 7" descr="Une image contenant carte de visite, texte, Police, capture d’écran&#10;&#10;Le contenu généré par l’IA peut être incorrect.">
+            <a:extLst>
+              <a:ext uri="{FF2B5EF4-FFF2-40B4-BE49-F238E27FC236}">
+                <a16:creationId xmlns:a16="http://schemas.microsoft.com/office/drawing/2014/main" id="{68F3D6E2-8ADD-A2D4-CF5E-B30C531F1558}"/>
+              </a:ext>
+            </a:extLst>
+          </p:cNvPr>
+          <p:cNvPicPr>
+            <a:picLocks noChangeAspect="1"/>
+          </p:cNvPicPr>
+          <p:nvPr/>
+        </p:nvPicPr>
+        <p:blipFill>
+          <a:blip r:embed="rId9">
+            <a:extLst>
+              <a:ext uri="{28A0092B-C50C-407E-A947-70E740481C1C}">
+                <a14:useLocalDpi xmlns:a14="http://schemas.microsoft.com/office/drawing/2010/main" val="0"/>
+              </a:ext>
+            </a:extLst>
+          </a:blip>
+          <a:srcRect t="55343" r="25540" b="19855"/>
+          <a:stretch/>
+        </p:blipFill>
+        <p:spPr>
+          <a:xfrm>
+            <a:off x="6623233" y="5457664"/>
+            <a:ext cx="2580322" cy="1145301"/>
+          </a:xfrm>
+          <a:prstGeom prst="rect">
+            <a:avLst/>
+          </a:prstGeom>
+        </p:spPr>
+      </p:pic>
+      <p:pic>
+        <p:nvPicPr>
+          <p:cNvPr id="11" name="Image 10" descr="Une image contenant obscurité, noir, art&#10;&#10;Le contenu généré par l’IA peut être incorrect.">
+            <a:extLst>
+              <a:ext uri="{FF2B5EF4-FFF2-40B4-BE49-F238E27FC236}">
+                <a16:creationId xmlns:a16="http://schemas.microsoft.com/office/drawing/2014/main" id="{209B2616-68F5-A16D-89B6-0373A18090D4}"/>
+              </a:ext>
+            </a:extLst>
+          </p:cNvPr>
+          <p:cNvPicPr>
+            <a:picLocks noChangeAspect="1"/>
+          </p:cNvPicPr>
+          <p:nvPr/>
+        </p:nvPicPr>
+        <p:blipFill>
+          <a:blip r:embed="rId10">
+            <a:extLst>
+              <a:ext uri="{28A0092B-C50C-407E-A947-70E740481C1C}">
+                <a14:useLocalDpi xmlns:a14="http://schemas.microsoft.com/office/drawing/2010/main" val="0"/>
+              </a:ext>
+            </a:extLst>
+          </a:blip>
+          <a:srcRect l="24873" t="45283" r="24319" b="39186"/>
+          <a:stretch/>
+        </p:blipFill>
+        <p:spPr>
+          <a:xfrm>
+            <a:off x="9176352" y="6087059"/>
+            <a:ext cx="1860480" cy="757847"/>
           </a:xfrm>
           <a:prstGeom prst="rect">
             <a:avLst/>

</xml_diff>